<commit_message>
Add project description in README.md
</commit_message>
<xml_diff>
--- a/Deliverables/UserStories_and_Architecture.pptx
+++ b/Deliverables/UserStories_and_Architecture.pptx
@@ -7,7 +7,8 @@
   <p:sldIdLst>
     <p:sldId id="256" r:id="rId2"/>
     <p:sldId id="257" r:id="rId3"/>
-    <p:sldId id="260" r:id="rId4"/>
+    <p:sldId id="262" r:id="rId4"/>
+    <p:sldId id="260" r:id="rId5"/>
   </p:sldIdLst>
   <p:sldSz cx="12192000" cy="6858000"/>
   <p:notesSz cx="6858000" cy="9144000"/>
@@ -263,7 +264,7 @@
           <a:p>
             <a:fld id="{C301BAF9-4FBD-467D-AF7E-7C44BBEF6AC2}" type="datetimeFigureOut">
               <a:rPr lang="en-US" smtClean="0"/>
-              <a:t>5/20/2022</a:t>
+              <a:t>5/22/2022</a:t>
             </a:fld>
             <a:endParaRPr lang="en-US"/>
           </a:p>
@@ -463,7 +464,7 @@
           <a:p>
             <a:fld id="{C301BAF9-4FBD-467D-AF7E-7C44BBEF6AC2}" type="datetimeFigureOut">
               <a:rPr lang="en-US" smtClean="0"/>
-              <a:t>5/20/2022</a:t>
+              <a:t>5/22/2022</a:t>
             </a:fld>
             <a:endParaRPr lang="en-US"/>
           </a:p>
@@ -673,7 +674,7 @@
           <a:p>
             <a:fld id="{C301BAF9-4FBD-467D-AF7E-7C44BBEF6AC2}" type="datetimeFigureOut">
               <a:rPr lang="en-US" smtClean="0"/>
-              <a:t>5/20/2022</a:t>
+              <a:t>5/22/2022</a:t>
             </a:fld>
             <a:endParaRPr lang="en-US"/>
           </a:p>
@@ -873,7 +874,7 @@
           <a:p>
             <a:fld id="{C301BAF9-4FBD-467D-AF7E-7C44BBEF6AC2}" type="datetimeFigureOut">
               <a:rPr lang="en-US" smtClean="0"/>
-              <a:t>5/20/2022</a:t>
+              <a:t>5/22/2022</a:t>
             </a:fld>
             <a:endParaRPr lang="en-US"/>
           </a:p>
@@ -1149,7 +1150,7 @@
           <a:p>
             <a:fld id="{C301BAF9-4FBD-467D-AF7E-7C44BBEF6AC2}" type="datetimeFigureOut">
               <a:rPr lang="en-US" smtClean="0"/>
-              <a:t>5/20/2022</a:t>
+              <a:t>5/22/2022</a:t>
             </a:fld>
             <a:endParaRPr lang="en-US"/>
           </a:p>
@@ -1417,7 +1418,7 @@
           <a:p>
             <a:fld id="{C301BAF9-4FBD-467D-AF7E-7C44BBEF6AC2}" type="datetimeFigureOut">
               <a:rPr lang="en-US" smtClean="0"/>
-              <a:t>5/20/2022</a:t>
+              <a:t>5/22/2022</a:t>
             </a:fld>
             <a:endParaRPr lang="en-US"/>
           </a:p>
@@ -1832,7 +1833,7 @@
           <a:p>
             <a:fld id="{C301BAF9-4FBD-467D-AF7E-7C44BBEF6AC2}" type="datetimeFigureOut">
               <a:rPr lang="en-US" smtClean="0"/>
-              <a:t>5/20/2022</a:t>
+              <a:t>5/22/2022</a:t>
             </a:fld>
             <a:endParaRPr lang="en-US"/>
           </a:p>
@@ -1974,7 +1975,7 @@
           <a:p>
             <a:fld id="{C301BAF9-4FBD-467D-AF7E-7C44BBEF6AC2}" type="datetimeFigureOut">
               <a:rPr lang="en-US" smtClean="0"/>
-              <a:t>5/20/2022</a:t>
+              <a:t>5/22/2022</a:t>
             </a:fld>
             <a:endParaRPr lang="en-US"/>
           </a:p>
@@ -2087,7 +2088,7 @@
           <a:p>
             <a:fld id="{C301BAF9-4FBD-467D-AF7E-7C44BBEF6AC2}" type="datetimeFigureOut">
               <a:rPr lang="en-US" smtClean="0"/>
-              <a:t>5/20/2022</a:t>
+              <a:t>5/22/2022</a:t>
             </a:fld>
             <a:endParaRPr lang="en-US"/>
           </a:p>
@@ -2400,7 +2401,7 @@
           <a:p>
             <a:fld id="{C301BAF9-4FBD-467D-AF7E-7C44BBEF6AC2}" type="datetimeFigureOut">
               <a:rPr lang="en-US" smtClean="0"/>
-              <a:t>5/20/2022</a:t>
+              <a:t>5/22/2022</a:t>
             </a:fld>
             <a:endParaRPr lang="en-US"/>
           </a:p>
@@ -2689,7 +2690,7 @@
           <a:p>
             <a:fld id="{C301BAF9-4FBD-467D-AF7E-7C44BBEF6AC2}" type="datetimeFigureOut">
               <a:rPr lang="en-US" smtClean="0"/>
-              <a:t>5/20/2022</a:t>
+              <a:t>5/22/2022</a:t>
             </a:fld>
             <a:endParaRPr lang="en-US"/>
           </a:p>
@@ -2932,7 +2933,7 @@
           <a:p>
             <a:fld id="{C301BAF9-4FBD-467D-AF7E-7C44BBEF6AC2}" type="datetimeFigureOut">
               <a:rPr lang="en-US" smtClean="0"/>
-              <a:t>5/20/2022</a:t>
+              <a:t>5/22/2022</a:t>
             </a:fld>
             <a:endParaRPr lang="en-US"/>
           </a:p>
@@ -4576,10 +4577,950 @@
       </p:grpSpPr>
       <p:sp>
         <p:nvSpPr>
-          <p:cNvPr id="4" name="Title 3">
-            <a:extLst>
-              <a:ext uri="{FF2B5EF4-FFF2-40B4-BE49-F238E27FC236}">
-                <a16:creationId xmlns:a16="http://schemas.microsoft.com/office/drawing/2014/main" id="{FF3C4DB8-E52E-0A15-1904-743A796C06D5}"/>
+          <p:cNvPr id="24" name="Rectangle: Rounded Corners 23">
+            <a:extLst>
+              <a:ext uri="{FF2B5EF4-FFF2-40B4-BE49-F238E27FC236}">
+                <a16:creationId xmlns:a16="http://schemas.microsoft.com/office/drawing/2014/main" id="{3DB3617D-C381-01FF-6FC7-872DF670FEB9}"/>
+              </a:ext>
+            </a:extLst>
+          </p:cNvPr>
+          <p:cNvSpPr/>
+          <p:nvPr/>
+        </p:nvSpPr>
+        <p:spPr>
+          <a:xfrm>
+            <a:off x="7233436" y="3984652"/>
+            <a:ext cx="2149540" cy="914400"/>
+          </a:xfrm>
+          <a:prstGeom prst="roundRect">
+            <a:avLst/>
+          </a:prstGeom>
+        </p:spPr>
+        <p:style>
+          <a:lnRef idx="2">
+            <a:schemeClr val="accent5"/>
+          </a:lnRef>
+          <a:fillRef idx="1">
+            <a:schemeClr val="lt1"/>
+          </a:fillRef>
+          <a:effectRef idx="0">
+            <a:schemeClr val="accent5"/>
+          </a:effectRef>
+          <a:fontRef idx="minor">
+            <a:schemeClr val="dk1"/>
+          </a:fontRef>
+        </p:style>
+        <p:txBody>
+          <a:bodyPr rtlCol="0" anchor="ctr"/>
+          <a:lstStyle/>
+          <a:p>
+            <a:pPr algn="ctr"/>
+            <a:r>
+              <a:rPr lang="en-US" dirty="0"/>
+              <a:t>Email Dispatcher</a:t>
+            </a:r>
+          </a:p>
+          <a:p>
+            <a:pPr algn="ctr"/>
+            <a:r>
+              <a:rPr lang="en-US" dirty="0"/>
+              <a:t>(</a:t>
+            </a:r>
+            <a:r>
+              <a:rPr lang="en-US" i="1" dirty="0"/>
+              <a:t>.NET</a:t>
+            </a:r>
+            <a:r>
+              <a:rPr lang="en-US" dirty="0"/>
+              <a:t>)</a:t>
+            </a:r>
+          </a:p>
+        </p:txBody>
+      </p:sp>
+      <p:sp>
+        <p:nvSpPr>
+          <p:cNvPr id="26" name="Rectangle: Rounded Corners 25">
+            <a:extLst>
+              <a:ext uri="{FF2B5EF4-FFF2-40B4-BE49-F238E27FC236}">
+                <a16:creationId xmlns:a16="http://schemas.microsoft.com/office/drawing/2014/main" id="{76C7D858-4CF9-A881-72E0-1648D1A92226}"/>
+              </a:ext>
+            </a:extLst>
+          </p:cNvPr>
+          <p:cNvSpPr/>
+          <p:nvPr/>
+        </p:nvSpPr>
+        <p:spPr>
+          <a:xfrm>
+            <a:off x="5900250" y="2535271"/>
+            <a:ext cx="2149540" cy="914398"/>
+          </a:xfrm>
+          <a:prstGeom prst="roundRect">
+            <a:avLst/>
+          </a:prstGeom>
+        </p:spPr>
+        <p:style>
+          <a:lnRef idx="2">
+            <a:schemeClr val="accent3"/>
+          </a:lnRef>
+          <a:fillRef idx="1">
+            <a:schemeClr val="lt1"/>
+          </a:fillRef>
+          <a:effectRef idx="0">
+            <a:schemeClr val="accent3"/>
+          </a:effectRef>
+          <a:fontRef idx="minor">
+            <a:schemeClr val="dk1"/>
+          </a:fontRef>
+        </p:style>
+        <p:txBody>
+          <a:bodyPr rtlCol="0" anchor="ctr"/>
+          <a:lstStyle/>
+          <a:p>
+            <a:pPr algn="ctr"/>
+            <a:r>
+              <a:rPr lang="en-US" dirty="0"/>
+              <a:t>Message Broker</a:t>
+            </a:r>
+          </a:p>
+          <a:p>
+            <a:pPr algn="ctr"/>
+            <a:r>
+              <a:rPr lang="en-US" dirty="0"/>
+              <a:t>(</a:t>
+            </a:r>
+            <a:r>
+              <a:rPr lang="en-US" i="1" dirty="0"/>
+              <a:t>RabbitMQ</a:t>
+            </a:r>
+            <a:r>
+              <a:rPr lang="en-US" dirty="0"/>
+              <a:t>)</a:t>
+            </a:r>
+          </a:p>
+        </p:txBody>
+      </p:sp>
+      <p:sp>
+        <p:nvSpPr>
+          <p:cNvPr id="29" name="Rectangle: Rounded Corners 28">
+            <a:extLst>
+              <a:ext uri="{FF2B5EF4-FFF2-40B4-BE49-F238E27FC236}">
+                <a16:creationId xmlns:a16="http://schemas.microsoft.com/office/drawing/2014/main" id="{E888028D-38E9-0520-3209-C436F87D33B7}"/>
+              </a:ext>
+            </a:extLst>
+          </p:cNvPr>
+          <p:cNvSpPr/>
+          <p:nvPr/>
+        </p:nvSpPr>
+        <p:spPr>
+          <a:xfrm>
+            <a:off x="4771580" y="3984652"/>
+            <a:ext cx="2149540" cy="914399"/>
+          </a:xfrm>
+          <a:prstGeom prst="roundRect">
+            <a:avLst/>
+          </a:prstGeom>
+        </p:spPr>
+        <p:style>
+          <a:lnRef idx="2">
+            <a:schemeClr val="accent5"/>
+          </a:lnRef>
+          <a:fillRef idx="1">
+            <a:schemeClr val="lt1"/>
+          </a:fillRef>
+          <a:effectRef idx="0">
+            <a:schemeClr val="accent5"/>
+          </a:effectRef>
+          <a:fontRef idx="minor">
+            <a:schemeClr val="dk1"/>
+          </a:fontRef>
+        </p:style>
+        <p:txBody>
+          <a:bodyPr rtlCol="0" anchor="ctr"/>
+          <a:lstStyle/>
+          <a:p>
+            <a:pPr algn="ctr"/>
+            <a:r>
+              <a:rPr lang="en-US" dirty="0"/>
+              <a:t>Back-end API</a:t>
+            </a:r>
+          </a:p>
+          <a:p>
+            <a:pPr algn="ctr"/>
+            <a:r>
+              <a:rPr lang="en-US" dirty="0"/>
+              <a:t>(</a:t>
+            </a:r>
+            <a:r>
+              <a:rPr lang="en-US" i="1" dirty="0"/>
+              <a:t>.NET</a:t>
+            </a:r>
+            <a:r>
+              <a:rPr lang="en-US" dirty="0"/>
+              <a:t>)</a:t>
+            </a:r>
+          </a:p>
+        </p:txBody>
+      </p:sp>
+      <p:sp>
+        <p:nvSpPr>
+          <p:cNvPr id="45" name="Rectangle: Rounded Corners 44">
+            <a:extLst>
+              <a:ext uri="{FF2B5EF4-FFF2-40B4-BE49-F238E27FC236}">
+                <a16:creationId xmlns:a16="http://schemas.microsoft.com/office/drawing/2014/main" id="{635260C6-2CA5-103B-4951-69AF96D1F3F4}"/>
+              </a:ext>
+            </a:extLst>
+          </p:cNvPr>
+          <p:cNvSpPr/>
+          <p:nvPr/>
+        </p:nvSpPr>
+        <p:spPr>
+          <a:xfrm>
+            <a:off x="2263323" y="3984653"/>
+            <a:ext cx="2149540" cy="914400"/>
+          </a:xfrm>
+          <a:prstGeom prst="roundRect">
+            <a:avLst/>
+          </a:prstGeom>
+        </p:spPr>
+        <p:style>
+          <a:lnRef idx="2">
+            <a:schemeClr val="accent5"/>
+          </a:lnRef>
+          <a:fillRef idx="1">
+            <a:schemeClr val="lt1"/>
+          </a:fillRef>
+          <a:effectRef idx="0">
+            <a:schemeClr val="accent5"/>
+          </a:effectRef>
+          <a:fontRef idx="minor">
+            <a:schemeClr val="dk1"/>
+          </a:fontRef>
+        </p:style>
+        <p:txBody>
+          <a:bodyPr rtlCol="0" anchor="ctr"/>
+          <a:lstStyle/>
+          <a:p>
+            <a:pPr algn="ctr"/>
+            <a:r>
+              <a:rPr lang="en-US" dirty="0"/>
+              <a:t>Front-end Web App</a:t>
+            </a:r>
+          </a:p>
+          <a:p>
+            <a:pPr algn="ctr"/>
+            <a:r>
+              <a:rPr lang="en-US" dirty="0"/>
+              <a:t>(</a:t>
+            </a:r>
+            <a:r>
+              <a:rPr lang="en-US" i="1" dirty="0"/>
+              <a:t>React</a:t>
+            </a:r>
+            <a:r>
+              <a:rPr lang="en-US" dirty="0"/>
+              <a:t>)</a:t>
+            </a:r>
+          </a:p>
+        </p:txBody>
+      </p:sp>
+      <p:sp>
+        <p:nvSpPr>
+          <p:cNvPr id="46" name="Rectangle: Rounded Corners 45">
+            <a:extLst>
+              <a:ext uri="{FF2B5EF4-FFF2-40B4-BE49-F238E27FC236}">
+                <a16:creationId xmlns:a16="http://schemas.microsoft.com/office/drawing/2014/main" id="{9C597619-FFDF-62C7-0183-B8FA3E48F52D}"/>
+              </a:ext>
+            </a:extLst>
+          </p:cNvPr>
+          <p:cNvSpPr/>
+          <p:nvPr/>
+        </p:nvSpPr>
+        <p:spPr>
+          <a:xfrm>
+            <a:off x="316868" y="2535270"/>
+            <a:ext cx="2375837" cy="914399"/>
+          </a:xfrm>
+          <a:prstGeom prst="roundRect">
+            <a:avLst/>
+          </a:prstGeom>
+        </p:spPr>
+        <p:style>
+          <a:lnRef idx="2">
+            <a:schemeClr val="accent3"/>
+          </a:lnRef>
+          <a:fillRef idx="1">
+            <a:schemeClr val="lt1"/>
+          </a:fillRef>
+          <a:effectRef idx="0">
+            <a:schemeClr val="accent3"/>
+          </a:effectRef>
+          <a:fontRef idx="minor">
+            <a:schemeClr val="dk1"/>
+          </a:fontRef>
+        </p:style>
+        <p:txBody>
+          <a:bodyPr rtlCol="0" anchor="ctr"/>
+          <a:lstStyle/>
+          <a:p>
+            <a:pPr algn="ctr"/>
+            <a:r>
+              <a:rPr lang="en-US" dirty="0"/>
+              <a:t>Authentication Service</a:t>
+            </a:r>
+          </a:p>
+          <a:p>
+            <a:pPr algn="ctr"/>
+            <a:r>
+              <a:rPr lang="en-US" dirty="0"/>
+              <a:t>(3</a:t>
+            </a:r>
+            <a:r>
+              <a:rPr lang="en-US" baseline="30000" dirty="0"/>
+              <a:t>rd</a:t>
+            </a:r>
+            <a:r>
+              <a:rPr lang="en-US" dirty="0"/>
+              <a:t> party: </a:t>
+            </a:r>
+            <a:r>
+              <a:rPr lang="en-US" i="1" dirty="0"/>
+              <a:t>Auth0</a:t>
+            </a:r>
+            <a:r>
+              <a:rPr lang="en-US" dirty="0"/>
+              <a:t>)</a:t>
+            </a:r>
+          </a:p>
+        </p:txBody>
+      </p:sp>
+      <p:pic>
+        <p:nvPicPr>
+          <p:cNvPr id="48" name="Graphic 47" descr="Computer outline">
+            <a:extLst>
+              <a:ext uri="{FF2B5EF4-FFF2-40B4-BE49-F238E27FC236}">
+                <a16:creationId xmlns:a16="http://schemas.microsoft.com/office/drawing/2014/main" id="{98CC63AB-6528-5551-8E34-CBEBB037D256}"/>
+              </a:ext>
+            </a:extLst>
+          </p:cNvPr>
+          <p:cNvPicPr>
+            <a:picLocks noChangeAspect="1"/>
+          </p:cNvPicPr>
+          <p:nvPr/>
+        </p:nvPicPr>
+        <p:blipFill>
+          <a:blip r:embed="rId2">
+            <a:extLst>
+              <a:ext uri="{28A0092B-C50C-407E-A947-70E740481C1C}">
+                <a14:useLocalDpi xmlns:a14="http://schemas.microsoft.com/office/drawing/2010/main" val="0"/>
+              </a:ext>
+              <a:ext uri="{96DAC541-7B7A-43D3-8B79-37D633B846F1}">
+                <asvg:svgBlip xmlns:asvg="http://schemas.microsoft.com/office/drawing/2016/SVG/main" r:embed="rId3"/>
+              </a:ext>
+            </a:extLst>
+          </a:blip>
+          <a:stretch>
+            <a:fillRect/>
+          </a:stretch>
+        </p:blipFill>
+        <p:spPr>
+          <a:xfrm>
+            <a:off x="926832" y="3984652"/>
+            <a:ext cx="914400" cy="914400"/>
+          </a:xfrm>
+          <a:prstGeom prst="rect">
+            <a:avLst/>
+          </a:prstGeom>
+        </p:spPr>
+      </p:pic>
+      <p:sp>
+        <p:nvSpPr>
+          <p:cNvPr id="49" name="Rectangle: Rounded Corners 48">
+            <a:extLst>
+              <a:ext uri="{FF2B5EF4-FFF2-40B4-BE49-F238E27FC236}">
+                <a16:creationId xmlns:a16="http://schemas.microsoft.com/office/drawing/2014/main" id="{C214E127-C621-B1C4-1D92-9C38A1EBA254}"/>
+              </a:ext>
+            </a:extLst>
+          </p:cNvPr>
+          <p:cNvSpPr/>
+          <p:nvPr/>
+        </p:nvSpPr>
+        <p:spPr>
+          <a:xfrm>
+            <a:off x="9741693" y="3984652"/>
+            <a:ext cx="2149540" cy="914398"/>
+          </a:xfrm>
+          <a:prstGeom prst="roundRect">
+            <a:avLst/>
+          </a:prstGeom>
+        </p:spPr>
+        <p:style>
+          <a:lnRef idx="2">
+            <a:schemeClr val="accent3"/>
+          </a:lnRef>
+          <a:fillRef idx="1">
+            <a:schemeClr val="lt1"/>
+          </a:fillRef>
+          <a:effectRef idx="0">
+            <a:schemeClr val="accent3"/>
+          </a:effectRef>
+          <a:fontRef idx="minor">
+            <a:schemeClr val="dk1"/>
+          </a:fontRef>
+        </p:style>
+        <p:txBody>
+          <a:bodyPr rtlCol="0" anchor="ctr"/>
+          <a:lstStyle/>
+          <a:p>
+            <a:pPr algn="ctr"/>
+            <a:r>
+              <a:rPr lang="en-US" dirty="0"/>
+              <a:t>Email Delivery</a:t>
+            </a:r>
+          </a:p>
+          <a:p>
+            <a:pPr algn="ctr"/>
+            <a:r>
+              <a:rPr lang="en-US" dirty="0"/>
+              <a:t>(3</a:t>
+            </a:r>
+            <a:r>
+              <a:rPr lang="en-US" baseline="30000" dirty="0"/>
+              <a:t>rd</a:t>
+            </a:r>
+            <a:r>
+              <a:rPr lang="en-US" dirty="0"/>
+              <a:t> party: </a:t>
+            </a:r>
+            <a:r>
+              <a:rPr lang="en-US" i="1" dirty="0" err="1"/>
+              <a:t>Mailjet</a:t>
+            </a:r>
+            <a:r>
+              <a:rPr lang="en-US" dirty="0"/>
+              <a:t>)</a:t>
+            </a:r>
+          </a:p>
+        </p:txBody>
+      </p:sp>
+      <p:sp>
+        <p:nvSpPr>
+          <p:cNvPr id="50" name="Rectangle: Rounded Corners 49">
+            <a:extLst>
+              <a:ext uri="{FF2B5EF4-FFF2-40B4-BE49-F238E27FC236}">
+                <a16:creationId xmlns:a16="http://schemas.microsoft.com/office/drawing/2014/main" id="{D7F5A749-7FBA-C598-CC80-2FC14D5AA8A1}"/>
+              </a:ext>
+            </a:extLst>
+          </p:cNvPr>
+          <p:cNvSpPr/>
+          <p:nvPr/>
+        </p:nvSpPr>
+        <p:spPr>
+          <a:xfrm>
+            <a:off x="4771580" y="5434337"/>
+            <a:ext cx="2149540" cy="914398"/>
+          </a:xfrm>
+          <a:prstGeom prst="roundRect">
+            <a:avLst/>
+          </a:prstGeom>
+        </p:spPr>
+        <p:style>
+          <a:lnRef idx="2">
+            <a:schemeClr val="accent3"/>
+          </a:lnRef>
+          <a:fillRef idx="1">
+            <a:schemeClr val="lt1"/>
+          </a:fillRef>
+          <a:effectRef idx="0">
+            <a:schemeClr val="accent3"/>
+          </a:effectRef>
+          <a:fontRef idx="minor">
+            <a:schemeClr val="dk1"/>
+          </a:fontRef>
+        </p:style>
+        <p:txBody>
+          <a:bodyPr rtlCol="0" anchor="ctr"/>
+          <a:lstStyle/>
+          <a:p>
+            <a:pPr algn="ctr"/>
+            <a:r>
+              <a:rPr lang="en-US" dirty="0"/>
+              <a:t>Database</a:t>
+            </a:r>
+          </a:p>
+          <a:p>
+            <a:pPr algn="ctr"/>
+            <a:r>
+              <a:rPr lang="en-US" dirty="0"/>
+              <a:t>(</a:t>
+            </a:r>
+            <a:r>
+              <a:rPr lang="en-US" i="1" dirty="0"/>
+              <a:t>PostgreSQL</a:t>
+            </a:r>
+            <a:r>
+              <a:rPr lang="en-US" dirty="0"/>
+              <a:t>)</a:t>
+            </a:r>
+          </a:p>
+        </p:txBody>
+      </p:sp>
+      <p:cxnSp>
+        <p:nvCxnSpPr>
+          <p:cNvPr id="52" name="Straight Arrow Connector 51">
+            <a:extLst>
+              <a:ext uri="{FF2B5EF4-FFF2-40B4-BE49-F238E27FC236}">
+                <a16:creationId xmlns:a16="http://schemas.microsoft.com/office/drawing/2014/main" id="{05327ED8-4FAE-5DF0-F16E-81A5F237B65A}"/>
+              </a:ext>
+            </a:extLst>
+          </p:cNvPr>
+          <p:cNvCxnSpPr>
+            <a:cxnSpLocks/>
+          </p:cNvCxnSpPr>
+          <p:nvPr/>
+        </p:nvCxnSpPr>
+        <p:spPr>
+          <a:xfrm flipV="1">
+            <a:off x="1212016" y="3531149"/>
+            <a:ext cx="0" cy="534983"/>
+          </a:xfrm>
+          <a:prstGeom prst="straightConnector1">
+            <a:avLst/>
+          </a:prstGeom>
+          <a:ln>
+            <a:tailEnd type="triangle"/>
+          </a:ln>
+        </p:spPr>
+        <p:style>
+          <a:lnRef idx="1">
+            <a:schemeClr val="accent1"/>
+          </a:lnRef>
+          <a:fillRef idx="0">
+            <a:schemeClr val="accent1"/>
+          </a:fillRef>
+          <a:effectRef idx="0">
+            <a:schemeClr val="accent1"/>
+          </a:effectRef>
+          <a:fontRef idx="minor">
+            <a:schemeClr val="tx1"/>
+          </a:fontRef>
+        </p:style>
+      </p:cxnSp>
+      <p:cxnSp>
+        <p:nvCxnSpPr>
+          <p:cNvPr id="54" name="Straight Arrow Connector 53">
+            <a:extLst>
+              <a:ext uri="{FF2B5EF4-FFF2-40B4-BE49-F238E27FC236}">
+                <a16:creationId xmlns:a16="http://schemas.microsoft.com/office/drawing/2014/main" id="{02B05062-A89B-2D79-4333-B372DA93AF26}"/>
+              </a:ext>
+            </a:extLst>
+          </p:cNvPr>
+          <p:cNvCxnSpPr>
+            <a:cxnSpLocks/>
+          </p:cNvCxnSpPr>
+          <p:nvPr/>
+        </p:nvCxnSpPr>
+        <p:spPr>
+          <a:xfrm>
+            <a:off x="1384032" y="3531149"/>
+            <a:ext cx="0" cy="534984"/>
+          </a:xfrm>
+          <a:prstGeom prst="straightConnector1">
+            <a:avLst/>
+          </a:prstGeom>
+          <a:ln>
+            <a:tailEnd type="triangle"/>
+          </a:ln>
+        </p:spPr>
+        <p:style>
+          <a:lnRef idx="1">
+            <a:schemeClr val="accent1"/>
+          </a:lnRef>
+          <a:fillRef idx="0">
+            <a:schemeClr val="accent1"/>
+          </a:fillRef>
+          <a:effectRef idx="0">
+            <a:schemeClr val="accent1"/>
+          </a:effectRef>
+          <a:fontRef idx="minor">
+            <a:schemeClr val="tx1"/>
+          </a:fontRef>
+        </p:style>
+      </p:cxnSp>
+      <p:cxnSp>
+        <p:nvCxnSpPr>
+          <p:cNvPr id="56" name="Straight Arrow Connector 55">
+            <a:extLst>
+              <a:ext uri="{FF2B5EF4-FFF2-40B4-BE49-F238E27FC236}">
+                <a16:creationId xmlns:a16="http://schemas.microsoft.com/office/drawing/2014/main" id="{CB845691-DE4F-1F41-A5CA-968BCB246AFF}"/>
+              </a:ext>
+            </a:extLst>
+          </p:cNvPr>
+          <p:cNvCxnSpPr/>
+          <p:nvPr/>
+        </p:nvCxnSpPr>
+        <p:spPr>
+          <a:xfrm>
+            <a:off x="1841232" y="4402241"/>
+            <a:ext cx="422091" cy="0"/>
+          </a:xfrm>
+          <a:prstGeom prst="straightConnector1">
+            <a:avLst/>
+          </a:prstGeom>
+          <a:ln>
+            <a:tailEnd type="triangle"/>
+          </a:ln>
+        </p:spPr>
+        <p:style>
+          <a:lnRef idx="1">
+            <a:schemeClr val="accent1"/>
+          </a:lnRef>
+          <a:fillRef idx="0">
+            <a:schemeClr val="accent1"/>
+          </a:fillRef>
+          <a:effectRef idx="0">
+            <a:schemeClr val="accent1"/>
+          </a:effectRef>
+          <a:fontRef idx="minor">
+            <a:schemeClr val="tx1"/>
+          </a:fontRef>
+        </p:style>
+      </p:cxnSp>
+      <p:cxnSp>
+        <p:nvCxnSpPr>
+          <p:cNvPr id="58" name="Straight Arrow Connector 57">
+            <a:extLst>
+              <a:ext uri="{FF2B5EF4-FFF2-40B4-BE49-F238E27FC236}">
+                <a16:creationId xmlns:a16="http://schemas.microsoft.com/office/drawing/2014/main" id="{CB553A32-95D0-C03A-5E6B-B289807445BD}"/>
+              </a:ext>
+            </a:extLst>
+          </p:cNvPr>
+          <p:cNvCxnSpPr>
+            <a:cxnSpLocks/>
+          </p:cNvCxnSpPr>
+          <p:nvPr/>
+        </p:nvCxnSpPr>
+        <p:spPr>
+          <a:xfrm flipH="1" flipV="1">
+            <a:off x="1841232" y="4531442"/>
+            <a:ext cx="422091" cy="1"/>
+          </a:xfrm>
+          <a:prstGeom prst="straightConnector1">
+            <a:avLst/>
+          </a:prstGeom>
+          <a:ln>
+            <a:tailEnd type="triangle"/>
+          </a:ln>
+        </p:spPr>
+        <p:style>
+          <a:lnRef idx="1">
+            <a:schemeClr val="accent1"/>
+          </a:lnRef>
+          <a:fillRef idx="0">
+            <a:schemeClr val="accent1"/>
+          </a:fillRef>
+          <a:effectRef idx="0">
+            <a:schemeClr val="accent1"/>
+          </a:effectRef>
+          <a:fontRef idx="minor">
+            <a:schemeClr val="tx1"/>
+          </a:fontRef>
+        </p:style>
+      </p:cxnSp>
+      <p:cxnSp>
+        <p:nvCxnSpPr>
+          <p:cNvPr id="59" name="Straight Arrow Connector 58">
+            <a:extLst>
+              <a:ext uri="{FF2B5EF4-FFF2-40B4-BE49-F238E27FC236}">
+                <a16:creationId xmlns:a16="http://schemas.microsoft.com/office/drawing/2014/main" id="{6E531873-5656-A1FB-AF17-042C4270F2D2}"/>
+              </a:ext>
+            </a:extLst>
+          </p:cNvPr>
+          <p:cNvCxnSpPr>
+            <a:cxnSpLocks/>
+          </p:cNvCxnSpPr>
+          <p:nvPr/>
+        </p:nvCxnSpPr>
+        <p:spPr>
+          <a:xfrm>
+            <a:off x="4412863" y="4402241"/>
+            <a:ext cx="358717" cy="0"/>
+          </a:xfrm>
+          <a:prstGeom prst="straightConnector1">
+            <a:avLst/>
+          </a:prstGeom>
+          <a:ln>
+            <a:tailEnd type="triangle"/>
+          </a:ln>
+        </p:spPr>
+        <p:style>
+          <a:lnRef idx="1">
+            <a:schemeClr val="accent1"/>
+          </a:lnRef>
+          <a:fillRef idx="0">
+            <a:schemeClr val="accent1"/>
+          </a:fillRef>
+          <a:effectRef idx="0">
+            <a:schemeClr val="accent1"/>
+          </a:effectRef>
+          <a:fontRef idx="minor">
+            <a:schemeClr val="tx1"/>
+          </a:fontRef>
+        </p:style>
+      </p:cxnSp>
+      <p:cxnSp>
+        <p:nvCxnSpPr>
+          <p:cNvPr id="61" name="Straight Arrow Connector 60">
+            <a:extLst>
+              <a:ext uri="{FF2B5EF4-FFF2-40B4-BE49-F238E27FC236}">
+                <a16:creationId xmlns:a16="http://schemas.microsoft.com/office/drawing/2014/main" id="{2409B629-EA9C-21BD-EF0F-81FD2D6F2B3D}"/>
+              </a:ext>
+            </a:extLst>
+          </p:cNvPr>
+          <p:cNvCxnSpPr>
+            <a:cxnSpLocks/>
+          </p:cNvCxnSpPr>
+          <p:nvPr/>
+        </p:nvCxnSpPr>
+        <p:spPr>
+          <a:xfrm>
+            <a:off x="9382976" y="4449396"/>
+            <a:ext cx="358717" cy="0"/>
+          </a:xfrm>
+          <a:prstGeom prst="straightConnector1">
+            <a:avLst/>
+          </a:prstGeom>
+          <a:ln>
+            <a:tailEnd type="triangle"/>
+          </a:ln>
+        </p:spPr>
+        <p:style>
+          <a:lnRef idx="1">
+            <a:schemeClr val="accent1"/>
+          </a:lnRef>
+          <a:fillRef idx="0">
+            <a:schemeClr val="accent1"/>
+          </a:fillRef>
+          <a:effectRef idx="0">
+            <a:schemeClr val="accent1"/>
+          </a:effectRef>
+          <a:fontRef idx="minor">
+            <a:schemeClr val="tx1"/>
+          </a:fontRef>
+        </p:style>
+      </p:cxnSp>
+      <p:cxnSp>
+        <p:nvCxnSpPr>
+          <p:cNvPr id="62" name="Straight Arrow Connector 61">
+            <a:extLst>
+              <a:ext uri="{FF2B5EF4-FFF2-40B4-BE49-F238E27FC236}">
+                <a16:creationId xmlns:a16="http://schemas.microsoft.com/office/drawing/2014/main" id="{0D6BB21E-FCBD-D21C-C6B8-4F4E0E20A858}"/>
+              </a:ext>
+            </a:extLst>
+          </p:cNvPr>
+          <p:cNvCxnSpPr>
+            <a:cxnSpLocks/>
+            <a:stCxn id="29" idx="0"/>
+          </p:cNvCxnSpPr>
+          <p:nvPr/>
+        </p:nvCxnSpPr>
+        <p:spPr>
+          <a:xfrm flipV="1">
+            <a:off x="5846350" y="3449668"/>
+            <a:ext cx="763499" cy="534984"/>
+          </a:xfrm>
+          <a:prstGeom prst="straightConnector1">
+            <a:avLst/>
+          </a:prstGeom>
+          <a:ln>
+            <a:tailEnd type="triangle"/>
+          </a:ln>
+        </p:spPr>
+        <p:style>
+          <a:lnRef idx="1">
+            <a:schemeClr val="accent1"/>
+          </a:lnRef>
+          <a:fillRef idx="0">
+            <a:schemeClr val="accent1"/>
+          </a:fillRef>
+          <a:effectRef idx="0">
+            <a:schemeClr val="accent1"/>
+          </a:effectRef>
+          <a:fontRef idx="minor">
+            <a:schemeClr val="tx1"/>
+          </a:fontRef>
+        </p:style>
+      </p:cxnSp>
+      <p:cxnSp>
+        <p:nvCxnSpPr>
+          <p:cNvPr id="68" name="Straight Arrow Connector 67">
+            <a:extLst>
+              <a:ext uri="{FF2B5EF4-FFF2-40B4-BE49-F238E27FC236}">
+                <a16:creationId xmlns:a16="http://schemas.microsoft.com/office/drawing/2014/main" id="{3847071C-8882-3BD0-7A4C-FE8D706B987D}"/>
+              </a:ext>
+            </a:extLst>
+          </p:cNvPr>
+          <p:cNvCxnSpPr>
+            <a:cxnSpLocks/>
+            <a:endCxn id="24" idx="0"/>
+          </p:cNvCxnSpPr>
+          <p:nvPr/>
+        </p:nvCxnSpPr>
+        <p:spPr>
+          <a:xfrm>
+            <a:off x="7372305" y="3449668"/>
+            <a:ext cx="935901" cy="534984"/>
+          </a:xfrm>
+          <a:prstGeom prst="straightConnector1">
+            <a:avLst/>
+          </a:prstGeom>
+          <a:ln>
+            <a:tailEnd type="triangle"/>
+          </a:ln>
+        </p:spPr>
+        <p:style>
+          <a:lnRef idx="1">
+            <a:schemeClr val="accent1"/>
+          </a:lnRef>
+          <a:fillRef idx="0">
+            <a:schemeClr val="accent1"/>
+          </a:fillRef>
+          <a:effectRef idx="0">
+            <a:schemeClr val="accent1"/>
+          </a:effectRef>
+          <a:fontRef idx="minor">
+            <a:schemeClr val="tx1"/>
+          </a:fontRef>
+        </p:style>
+      </p:cxnSp>
+      <p:cxnSp>
+        <p:nvCxnSpPr>
+          <p:cNvPr id="74" name="Straight Arrow Connector 73">
+            <a:extLst>
+              <a:ext uri="{FF2B5EF4-FFF2-40B4-BE49-F238E27FC236}">
+                <a16:creationId xmlns:a16="http://schemas.microsoft.com/office/drawing/2014/main" id="{D7C1AC4E-E683-4DD5-89C3-EE68BBED27F2}"/>
+              </a:ext>
+            </a:extLst>
+          </p:cNvPr>
+          <p:cNvCxnSpPr>
+            <a:cxnSpLocks/>
+          </p:cNvCxnSpPr>
+          <p:nvPr/>
+        </p:nvCxnSpPr>
+        <p:spPr>
+          <a:xfrm>
+            <a:off x="5846350" y="4899049"/>
+            <a:ext cx="0" cy="535287"/>
+          </a:xfrm>
+          <a:prstGeom prst="straightConnector1">
+            <a:avLst/>
+          </a:prstGeom>
+          <a:ln>
+            <a:tailEnd type="triangle"/>
+          </a:ln>
+        </p:spPr>
+        <p:style>
+          <a:lnRef idx="1">
+            <a:schemeClr val="accent1"/>
+          </a:lnRef>
+          <a:fillRef idx="0">
+            <a:schemeClr val="accent1"/>
+          </a:fillRef>
+          <a:effectRef idx="0">
+            <a:schemeClr val="accent1"/>
+          </a:effectRef>
+          <a:fontRef idx="minor">
+            <a:schemeClr val="tx1"/>
+          </a:fontRef>
+        </p:style>
+      </p:cxnSp>
+      <p:cxnSp>
+        <p:nvCxnSpPr>
+          <p:cNvPr id="77" name="Straight Arrow Connector 76">
+            <a:extLst>
+              <a:ext uri="{FF2B5EF4-FFF2-40B4-BE49-F238E27FC236}">
+                <a16:creationId xmlns:a16="http://schemas.microsoft.com/office/drawing/2014/main" id="{5876E64A-0F9C-6FA1-A7B9-C4881701E711}"/>
+              </a:ext>
+            </a:extLst>
+          </p:cNvPr>
+          <p:cNvCxnSpPr>
+            <a:cxnSpLocks/>
+          </p:cNvCxnSpPr>
+          <p:nvPr/>
+        </p:nvCxnSpPr>
+        <p:spPr>
+          <a:xfrm flipH="1" flipV="1">
+            <a:off x="5970834" y="4905271"/>
+            <a:ext cx="9865" cy="535287"/>
+          </a:xfrm>
+          <a:prstGeom prst="straightConnector1">
+            <a:avLst/>
+          </a:prstGeom>
+          <a:ln>
+            <a:tailEnd type="triangle"/>
+          </a:ln>
+        </p:spPr>
+        <p:style>
+          <a:lnRef idx="1">
+            <a:schemeClr val="accent1"/>
+          </a:lnRef>
+          <a:fillRef idx="0">
+            <a:schemeClr val="accent1"/>
+          </a:fillRef>
+          <a:effectRef idx="0">
+            <a:schemeClr val="accent1"/>
+          </a:effectRef>
+          <a:fontRef idx="minor">
+            <a:schemeClr val="tx1"/>
+          </a:fontRef>
+        </p:style>
+      </p:cxnSp>
+      <p:cxnSp>
+        <p:nvCxnSpPr>
+          <p:cNvPr id="81" name="Straight Arrow Connector 80">
+            <a:extLst>
+              <a:ext uri="{FF2B5EF4-FFF2-40B4-BE49-F238E27FC236}">
+                <a16:creationId xmlns:a16="http://schemas.microsoft.com/office/drawing/2014/main" id="{80A8336D-E307-F310-0AD5-877C07FF40FB}"/>
+              </a:ext>
+            </a:extLst>
+          </p:cNvPr>
+          <p:cNvCxnSpPr>
+            <a:cxnSpLocks/>
+          </p:cNvCxnSpPr>
+          <p:nvPr/>
+        </p:nvCxnSpPr>
+        <p:spPr>
+          <a:xfrm flipH="1">
+            <a:off x="4412863" y="4531442"/>
+            <a:ext cx="358717" cy="0"/>
+          </a:xfrm>
+          <a:prstGeom prst="straightConnector1">
+            <a:avLst/>
+          </a:prstGeom>
+          <a:ln>
+            <a:tailEnd type="triangle"/>
+          </a:ln>
+        </p:spPr>
+        <p:style>
+          <a:lnRef idx="1">
+            <a:schemeClr val="accent1"/>
+          </a:lnRef>
+          <a:fillRef idx="0">
+            <a:schemeClr val="accent1"/>
+          </a:fillRef>
+          <a:effectRef idx="0">
+            <a:schemeClr val="accent1"/>
+          </a:effectRef>
+          <a:fontRef idx="minor">
+            <a:schemeClr val="tx1"/>
+          </a:fontRef>
+        </p:style>
+      </p:cxnSp>
+      <p:sp>
+        <p:nvSpPr>
+          <p:cNvPr id="86" name="Title 3">
+            <a:extLst>
+              <a:ext uri="{FF2B5EF4-FFF2-40B4-BE49-F238E27FC236}">
+                <a16:creationId xmlns:a16="http://schemas.microsoft.com/office/drawing/2014/main" id="{F5E9C7D9-013A-659B-D4D9-08D6A98453BD}"/>
               </a:ext>
             </a:extLst>
           </p:cNvPr>
@@ -4623,10 +5564,94 @@
           <a:p>
             <a:pPr algn="l"/>
             <a:r>
-              <a:rPr lang="en-US"/>
-              <a:t>Architecture</a:t>
-            </a:r>
-            <a:endParaRPr lang="en-US" dirty="0"/>
+              <a:rPr lang="en-US" dirty="0"/>
+              <a:t>Macro Architecture</a:t>
+            </a:r>
+          </a:p>
+        </p:txBody>
+      </p:sp>
+    </p:spTree>
+    <p:extLst>
+      <p:ext uri="{BB962C8B-B14F-4D97-AF65-F5344CB8AC3E}">
+        <p14:creationId xmlns:p14="http://schemas.microsoft.com/office/powerpoint/2010/main" val="2864124912"/>
+      </p:ext>
+    </p:extLst>
+  </p:cSld>
+  <p:clrMapOvr>
+    <a:masterClrMapping/>
+  </p:clrMapOvr>
+</p:sld>
+</file>
+
+<file path=ppt/slides/slide4.xml><?xml version="1.0" encoding="utf-8"?>
+<p:sld xmlns:a="http://schemas.openxmlformats.org/drawingml/2006/main" xmlns:r="http://schemas.openxmlformats.org/officeDocument/2006/relationships" xmlns:p="http://schemas.openxmlformats.org/presentationml/2006/main">
+  <p:cSld>
+    <p:spTree>
+      <p:nvGrpSpPr>
+        <p:cNvPr id="1" name=""/>
+        <p:cNvGrpSpPr/>
+        <p:nvPr/>
+      </p:nvGrpSpPr>
+      <p:grpSpPr>
+        <a:xfrm>
+          <a:off x="0" y="0"/>
+          <a:ext cx="0" cy="0"/>
+          <a:chOff x="0" y="0"/>
+          <a:chExt cx="0" cy="0"/>
+        </a:xfrm>
+      </p:grpSpPr>
+      <p:sp>
+        <p:nvSpPr>
+          <p:cNvPr id="4" name="Title 3">
+            <a:extLst>
+              <a:ext uri="{FF2B5EF4-FFF2-40B4-BE49-F238E27FC236}">
+                <a16:creationId xmlns:a16="http://schemas.microsoft.com/office/drawing/2014/main" id="{FF3C4DB8-E52E-0A15-1904-743A796C06D5}"/>
+              </a:ext>
+            </a:extLst>
+          </p:cNvPr>
+          <p:cNvSpPr txBox="1">
+            <a:spLocks/>
+          </p:cNvSpPr>
+          <p:nvPr/>
+        </p:nvSpPr>
+        <p:spPr>
+          <a:xfrm>
+            <a:off x="838200" y="365125"/>
+            <a:ext cx="10515600" cy="1325563"/>
+          </a:xfrm>
+          <a:prstGeom prst="rect">
+            <a:avLst/>
+          </a:prstGeom>
+        </p:spPr>
+        <p:txBody>
+          <a:bodyPr vert="horz" lIns="91440" tIns="45720" rIns="91440" bIns="45720" rtlCol="0" anchor="b">
+            <a:normAutofit/>
+          </a:bodyPr>
+          <a:lstStyle>
+            <a:lvl1pPr algn="ctr" defTabSz="914400" rtl="0" eaLnBrk="1" latinLnBrk="0" hangingPunct="1">
+              <a:lnSpc>
+                <a:spcPct val="90000"/>
+              </a:lnSpc>
+              <a:spcBef>
+                <a:spcPct val="0"/>
+              </a:spcBef>
+              <a:buNone/>
+              <a:defRPr sz="6000" kern="1200">
+                <a:solidFill>
+                  <a:schemeClr val="tx1"/>
+                </a:solidFill>
+                <a:latin typeface="+mj-lt"/>
+                <a:ea typeface="+mj-ea"/>
+                <a:cs typeface="+mj-cs"/>
+              </a:defRPr>
+            </a:lvl1pPr>
+          </a:lstStyle>
+          <a:p>
+            <a:pPr algn="l"/>
+            <a:r>
+              <a:rPr lang="en-US" dirty="0"/>
+              <a:t>Entities</a:t>
+            </a:r>
           </a:p>
         </p:txBody>
       </p:sp>
@@ -5389,7 +6414,7 @@
         <p:spPr>
           <a:xfrm>
             <a:off x="5659335" y="3953064"/>
-            <a:ext cx="0" cy="371286"/>
+            <a:ext cx="0" cy="435586"/>
           </a:xfrm>
           <a:prstGeom prst="line">
             <a:avLst/>
@@ -5709,13 +6734,13 @@
         </p:spPr>
         <p:style>
           <a:lnRef idx="2">
-            <a:schemeClr val="accent4"/>
+            <a:schemeClr val="accent6"/>
           </a:lnRef>
           <a:fillRef idx="1">
             <a:schemeClr val="lt1"/>
           </a:fillRef>
           <a:effectRef idx="0">
-            <a:schemeClr val="accent4"/>
+            <a:schemeClr val="accent6"/>
           </a:effectRef>
           <a:fontRef idx="minor">
             <a:schemeClr val="dk1"/>

</xml_diff>